<commit_message>
fix: alteração slide estrutura dados
</commit_message>
<xml_diff>
--- a/Slides/Javascript/Estruturas Dados Iteracao.pptx
+++ b/Slides/Javascript/Estruturas Dados Iteracao.pptx
@@ -7716,37 +7716,43 @@
               <a:rPr lang="en-US" altLang="pt-BR" sz="2000"/>
               <a:t>});</a:t>
             </a:r>
-            <a:endParaRPr lang="en-US" altLang="pt-BR"/>
+            <a:endParaRPr lang="en-US" altLang="pt-BR" sz="2000"/>
           </a:p>
           <a:p>
             <a:pPr marL="0" indent="0">
               <a:buNone/>
             </a:pPr>
             <a:r>
-              <a:rPr sz="2000"/>
+              <a:rPr lang="en-US" altLang="pt-BR" sz="2000"/>
               <a:t>// Filtra aprovados</a:t>
             </a:r>
-            <a:endParaRPr sz="2000"/>
+            <a:endParaRPr lang="en-US" altLang="pt-BR" sz="2000"/>
           </a:p>
           <a:p>
             <a:pPr marL="0" indent="0">
               <a:buNone/>
             </a:pPr>
             <a:r>
-              <a:rPr sz="2000"/>
-              <a:t>const aprovados = alunos.filter(aluno =&gt; aluno.media &gt;= 7);</a:t>
-            </a:r>
-            <a:endParaRPr sz="2000"/>
+              <a:rPr lang="en-US" altLang="pt-BR" sz="2000"/>
+              <a:t>const aprovados = alunosComMedia.filter(aluno =&gt; aluno.media &gt;= 7);</a:t>
+            </a:r>
+            <a:endParaRPr lang="en-US" altLang="pt-BR" sz="2000"/>
           </a:p>
           <a:p>
             <a:pPr marL="0" indent="0">
               <a:buNone/>
             </a:pPr>
             <a:r>
-              <a:rPr sz="2000"/>
+              <a:rPr lang="en-US" altLang="pt-BR" sz="2000"/>
               <a:t>console.log(aprovados);</a:t>
             </a:r>
-            <a:endParaRPr sz="2000"/>
+            <a:endParaRPr lang="en-US" altLang="pt-BR" sz="2000"/>
+          </a:p>
+          <a:p>
+            <a:pPr marL="0" indent="0">
+              <a:buNone/>
+            </a:pPr>
+            <a:endParaRPr lang="en-US" altLang="pt-BR" sz="2000"/>
           </a:p>
         </p:txBody>
       </p:sp>

</xml_diff>